<commit_message>
updated week 1 notes
</commit_message>
<xml_diff>
--- a/lecture_notes/introduction/introduction3.pptx
+++ b/lecture_notes/introduction/introduction3.pptx
@@ -137,10 +137,93 @@
   <pc:docChgLst>
     <pc:chgData name="Toby Donaldson" userId="2e6e5431-bb17-4c41-9985-d39c50d83c73" providerId="ADAL" clId="{F31BC264-820E-54C4-A6D1-F92AF9CC222E}"/>
     <pc:docChg chg="custSel addSld delSld modSld sldOrd">
-      <pc:chgData name="Toby Donaldson" userId="2e6e5431-bb17-4c41-9985-d39c50d83c73" providerId="ADAL" clId="{F31BC264-820E-54C4-A6D1-F92AF9CC222E}" dt="2026-01-07T17:11:02.826" v="44" actId="21"/>
+      <pc:chgData name="Toby Donaldson" userId="2e6e5431-bb17-4c41-9985-d39c50d83c73" providerId="ADAL" clId="{F31BC264-820E-54C4-A6D1-F92AF9CC222E}" dt="2026-01-09T17:13:21.263" v="69" actId="113"/>
       <pc:docMkLst>
         <pc:docMk/>
       </pc:docMkLst>
+      <pc:sldChg chg="modSp mod">
+        <pc:chgData name="Toby Donaldson" userId="2e6e5431-bb17-4c41-9985-d39c50d83c73" providerId="ADAL" clId="{F31BC264-820E-54C4-A6D1-F92AF9CC222E}" dt="2026-01-09T17:09:46.648" v="49" actId="20577"/>
+        <pc:sldMkLst>
+          <pc:docMk/>
+          <pc:sldMk cId="1199209444" sldId="296"/>
+        </pc:sldMkLst>
+        <pc:spChg chg="mod">
+          <ac:chgData name="Toby Donaldson" userId="2e6e5431-bb17-4c41-9985-d39c50d83c73" providerId="ADAL" clId="{F31BC264-820E-54C4-A6D1-F92AF9CC222E}" dt="2026-01-09T17:09:46.648" v="49" actId="20577"/>
+          <ac:spMkLst>
+            <pc:docMk/>
+            <pc:sldMk cId="1199209444" sldId="296"/>
+            <ac:spMk id="2" creationId="{EDFEF7C8-492A-66D8-4EDD-FCD4BC6F31BA}"/>
+          </ac:spMkLst>
+        </pc:spChg>
+      </pc:sldChg>
+      <pc:sldChg chg="modSp mod">
+        <pc:chgData name="Toby Donaldson" userId="2e6e5431-bb17-4c41-9985-d39c50d83c73" providerId="ADAL" clId="{F31BC264-820E-54C4-A6D1-F92AF9CC222E}" dt="2026-01-09T17:09:51.280" v="54" actId="20577"/>
+        <pc:sldMkLst>
+          <pc:docMk/>
+          <pc:sldMk cId="3142749539" sldId="297"/>
+        </pc:sldMkLst>
+        <pc:spChg chg="mod">
+          <ac:chgData name="Toby Donaldson" userId="2e6e5431-bb17-4c41-9985-d39c50d83c73" providerId="ADAL" clId="{F31BC264-820E-54C4-A6D1-F92AF9CC222E}" dt="2026-01-09T17:09:51.280" v="54" actId="20577"/>
+          <ac:spMkLst>
+            <pc:docMk/>
+            <pc:sldMk cId="3142749539" sldId="297"/>
+            <ac:spMk id="2" creationId="{FAD43708-033A-A98B-503C-CE26829120D5}"/>
+          </ac:spMkLst>
+        </pc:spChg>
+      </pc:sldChg>
+      <pc:sldChg chg="modSp mod">
+        <pc:chgData name="Toby Donaldson" userId="2e6e5431-bb17-4c41-9985-d39c50d83c73" providerId="ADAL" clId="{F31BC264-820E-54C4-A6D1-F92AF9CC222E}" dt="2026-01-09T17:10:10.621" v="67" actId="1076"/>
+        <pc:sldMkLst>
+          <pc:docMk/>
+          <pc:sldMk cId="1367215302" sldId="298"/>
+        </pc:sldMkLst>
+        <pc:spChg chg="mod">
+          <ac:chgData name="Toby Donaldson" userId="2e6e5431-bb17-4c41-9985-d39c50d83c73" providerId="ADAL" clId="{F31BC264-820E-54C4-A6D1-F92AF9CC222E}" dt="2026-01-09T17:10:03.805" v="66" actId="20577"/>
+          <ac:spMkLst>
+            <pc:docMk/>
+            <pc:sldMk cId="1367215302" sldId="298"/>
+            <ac:spMk id="2" creationId="{312E4412-8BF5-A3BB-2792-D96C68C513D0}"/>
+          </ac:spMkLst>
+        </pc:spChg>
+        <pc:spChg chg="mod">
+          <ac:chgData name="Toby Donaldson" userId="2e6e5431-bb17-4c41-9985-d39c50d83c73" providerId="ADAL" clId="{F31BC264-820E-54C4-A6D1-F92AF9CC222E}" dt="2026-01-09T17:10:10.621" v="67" actId="1076"/>
+          <ac:spMkLst>
+            <pc:docMk/>
+            <pc:sldMk cId="1367215302" sldId="298"/>
+            <ac:spMk id="10" creationId="{570C3ACA-B932-3F2F-40C6-C3007387B4F9}"/>
+          </ac:spMkLst>
+        </pc:spChg>
+      </pc:sldChg>
+      <pc:sldChg chg="modSp mod">
+        <pc:chgData name="Toby Donaldson" userId="2e6e5431-bb17-4c41-9985-d39c50d83c73" providerId="ADAL" clId="{F31BC264-820E-54C4-A6D1-F92AF9CC222E}" dt="2026-01-09T17:09:55.493" v="59" actId="20577"/>
+        <pc:sldMkLst>
+          <pc:docMk/>
+          <pc:sldMk cId="3817808022" sldId="299"/>
+        </pc:sldMkLst>
+        <pc:spChg chg="mod">
+          <ac:chgData name="Toby Donaldson" userId="2e6e5431-bb17-4c41-9985-d39c50d83c73" providerId="ADAL" clId="{F31BC264-820E-54C4-A6D1-F92AF9CC222E}" dt="2026-01-09T17:09:55.493" v="59" actId="20577"/>
+          <ac:spMkLst>
+            <pc:docMk/>
+            <pc:sldMk cId="3817808022" sldId="299"/>
+            <ac:spMk id="2" creationId="{2B9C9FBD-DE7D-D2B2-F656-474268C8EF33}"/>
+          </ac:spMkLst>
+        </pc:spChg>
+      </pc:sldChg>
+      <pc:sldChg chg="modSp mod">
+        <pc:chgData name="Toby Donaldson" userId="2e6e5431-bb17-4c41-9985-d39c50d83c73" providerId="ADAL" clId="{F31BC264-820E-54C4-A6D1-F92AF9CC222E}" dt="2026-01-09T17:13:21.263" v="69" actId="113"/>
+        <pc:sldMkLst>
+          <pc:docMk/>
+          <pc:sldMk cId="2291307079" sldId="304"/>
+        </pc:sldMkLst>
+        <pc:spChg chg="mod">
+          <ac:chgData name="Toby Donaldson" userId="2e6e5431-bb17-4c41-9985-d39c50d83c73" providerId="ADAL" clId="{F31BC264-820E-54C4-A6D1-F92AF9CC222E}" dt="2026-01-09T17:13:21.263" v="69" actId="113"/>
+          <ac:spMkLst>
+            <pc:docMk/>
+            <pc:sldMk cId="2291307079" sldId="304"/>
+            <ac:spMk id="3" creationId="{0BEF9544-9E9A-73D6-BF8C-C82350813AEA}"/>
+          </ac:spMkLst>
+        </pc:spChg>
+      </pc:sldChg>
     </pc:docChg>
   </pc:docChgLst>
   <pc:docChgLst>
@@ -2956,10 +3039,10 @@
           <a:lstStyle/>
           <a:p>
             <a:r>
-              <a:rPr lang="en-US"/>
+              <a:rPr lang="en-US" dirty="0"/>
               <a:t>CMPT 120, SFU Burnaby, Spring 2026, Instructor: T. Donaldson</a:t>
             </a:r>
-            <a:endParaRPr lang="en-AU"/>
+            <a:endParaRPr lang="en-AU" dirty="0"/>
           </a:p>
         </p:txBody>
       </p:sp>
@@ -4492,7 +4575,7 @@
           <a:lstStyle/>
           <a:p>
             <a:r>
-              <a:rPr lang="en-US"/>
+              <a:rPr lang="en-US" dirty="0"/>
               <a:t>Interacting with Python</a:t>
             </a:r>
           </a:p>
@@ -4520,19 +4603,19 @@
           <a:lstStyle/>
           <a:p>
             <a:r>
-              <a:rPr lang="en-US"/>
+              <a:rPr lang="en-US" dirty="0"/>
               <a:t>CMPT 120</a:t>
             </a:r>
           </a:p>
           <a:p>
             <a:r>
-              <a:rPr lang="en-US"/>
+              <a:rPr lang="en-US" dirty="0"/>
               <a:t>Spring 2026</a:t>
             </a:r>
           </a:p>
           <a:p>
             <a:r>
-              <a:rPr lang="en-US"/>
+              <a:rPr lang="en-US" dirty="0"/>
               <a:t>SFU Burnaby</a:t>
             </a:r>
           </a:p>
@@ -4560,10 +4643,10 @@
           <a:lstStyle/>
           <a:p>
             <a:r>
-              <a:rPr lang="en-US"/>
+              <a:rPr lang="en-US" dirty="0"/>
               <a:t>CMPT 120, SFU Burnaby, Spring 2026, Instructor: T. Donaldson</a:t>
             </a:r>
-            <a:endParaRPr lang="en-AU"/>
+            <a:endParaRPr lang="en-AU" dirty="0"/>
           </a:p>
         </p:txBody>
       </p:sp>
@@ -4648,7 +4731,7 @@
           <a:lstStyle/>
           <a:p>
             <a:r>
-              <a:rPr lang="en-US"/>
+              <a:rPr lang="en-US" dirty="0"/>
               <a:t>Advice for Saving Programs</a:t>
             </a:r>
           </a:p>
@@ -4676,35 +4759,39 @@
           <a:lstStyle/>
           <a:p>
             <a:r>
-              <a:rPr lang="en-US"/>
-              <a:t>All Python program files are text files and should end with </a:t>
-            </a:r>
-            <a:r>
-              <a:rPr lang="en-US">
+              <a:rPr lang="en-US" dirty="0"/>
+              <a:t>All Python program files are text files and should </a:t>
+            </a:r>
+            <a:r>
+              <a:rPr lang="en-US" b="1" dirty="0"/>
+              <a:t>end with </a:t>
+            </a:r>
+            <a:r>
+              <a:rPr lang="en-US" b="1" dirty="0">
                 <a:latin typeface="Consolas" panose="020B0609020204030204" pitchFamily="49" charset="0"/>
                 <a:cs typeface="Consolas" panose="020B0609020204030204" pitchFamily="49" charset="0"/>
               </a:rPr>
               <a:t>.</a:t>
             </a:r>
             <a:r>
-              <a:rPr lang="en-US" err="1">
+              <a:rPr lang="en-US" b="1" dirty="0" err="1">
                 <a:latin typeface="Consolas" panose="020B0609020204030204" pitchFamily="49" charset="0"/>
                 <a:cs typeface="Consolas" panose="020B0609020204030204" pitchFamily="49" charset="0"/>
               </a:rPr>
               <a:t>py</a:t>
             </a:r>
-            <a:endParaRPr lang="en-US">
+            <a:endParaRPr lang="en-US" b="1" dirty="0">
               <a:latin typeface="Consolas" panose="020B0609020204030204" pitchFamily="49" charset="0"/>
               <a:cs typeface="Consolas" panose="020B0609020204030204" pitchFamily="49" charset="0"/>
             </a:endParaRPr>
           </a:p>
           <a:p>
             <a:r>
-              <a:rPr lang="en-US"/>
+              <a:rPr lang="en-US" dirty="0"/>
               <a:t>Save these files in a folder on your desktop called </a:t>
             </a:r>
             <a:r>
-              <a:rPr lang="en-US">
+              <a:rPr lang="en-US" b="1" dirty="0">
                 <a:latin typeface="Consolas" panose="020B0609020204030204" pitchFamily="49" charset="0"/>
                 <a:cs typeface="Consolas" panose="020B0609020204030204" pitchFamily="49" charset="0"/>
               </a:rPr>
@@ -4714,29 +4801,29 @@
           <a:p>
             <a:pPr lvl="1"/>
             <a:r>
-              <a:rPr lang="en-US"/>
+              <a:rPr lang="en-US" dirty="0"/>
               <a:t>Inside this folder you should make folders </a:t>
             </a:r>
             <a:r>
-              <a:rPr lang="en-US">
+              <a:rPr lang="en-US" dirty="0">
                 <a:latin typeface="Consolas" panose="020B0609020204030204" pitchFamily="49" charset="0"/>
                 <a:cs typeface="Consolas" panose="020B0609020204030204" pitchFamily="49" charset="0"/>
               </a:rPr>
               <a:t>assignment1</a:t>
             </a:r>
             <a:r>
-              <a:rPr lang="en-US"/>
+              <a:rPr lang="en-US" dirty="0"/>
               <a:t>, </a:t>
             </a:r>
             <a:r>
-              <a:rPr lang="en-US">
+              <a:rPr lang="en-US" dirty="0">
                 <a:latin typeface="Consolas" panose="020B0609020204030204" pitchFamily="49" charset="0"/>
                 <a:cs typeface="Consolas" panose="020B0609020204030204" pitchFamily="49" charset="0"/>
               </a:rPr>
               <a:t>assignment2</a:t>
             </a:r>
             <a:r>
-              <a:rPr lang="en-US"/>
+              <a:rPr lang="en-US" dirty="0"/>
               <a:t>, etc.</a:t>
             </a:r>
           </a:p>
@@ -4852,8 +4939,8 @@
           <a:lstStyle/>
           <a:p>
             <a:r>
-              <a:rPr lang="en-US"/>
-              <a:t>2 Ways of Interacting with Python</a:t>
+              <a:rPr lang="en-US" dirty="0"/>
+              <a:t>2 Main Ways of Interacting with Python</a:t>
             </a:r>
           </a:p>
         </p:txBody>
@@ -4880,7 +4967,7 @@
           <a:lstStyle/>
           <a:p>
             <a:r>
-              <a:rPr lang="en-US"/>
+              <a:rPr lang="en-US" dirty="0"/>
               <a:t>Interpreter</a:t>
             </a:r>
           </a:p>
@@ -4907,7 +4994,7 @@
           <a:bodyPr/>
           <a:lstStyle/>
           <a:p>
-            <a:endParaRPr lang="en-US"/>
+            <a:endParaRPr lang="en-US" dirty="0"/>
           </a:p>
         </p:txBody>
       </p:sp>
@@ -4933,7 +5020,7 @@
           <a:lstStyle/>
           <a:p>
             <a:r>
-              <a:rPr lang="en-US"/>
+              <a:rPr lang="en-US" dirty="0"/>
               <a:t>Programs</a:t>
             </a:r>
           </a:p>
@@ -4960,7 +5047,7 @@
           <a:bodyPr/>
           <a:lstStyle/>
           <a:p>
-            <a:endParaRPr lang="en-US"/>
+            <a:endParaRPr lang="en-US" dirty="0"/>
           </a:p>
         </p:txBody>
       </p:sp>
@@ -4986,10 +5073,10 @@
           <a:lstStyle/>
           <a:p>
             <a:r>
-              <a:rPr lang="en-US"/>
+              <a:rPr lang="en-US" dirty="0"/>
               <a:t>CMPT 120, SFU Burnaby, Spring 2026, Instructor: T. Donaldson</a:t>
             </a:r>
-            <a:endParaRPr lang="en-AU"/>
+            <a:endParaRPr lang="en-AU" dirty="0"/>
           </a:p>
         </p:txBody>
       </p:sp>
@@ -5080,8 +5167,8 @@
           <a:lstStyle/>
           <a:p>
             <a:r>
-              <a:rPr lang="en-US"/>
-              <a:t>2 Ways of Interacting with Python</a:t>
+              <a:rPr lang="en-US" dirty="0"/>
+              <a:t>2 Main Ways of Interacting with Python</a:t>
             </a:r>
           </a:p>
         </p:txBody>
@@ -5108,7 +5195,7 @@
           <a:lstStyle/>
           <a:p>
             <a:r>
-              <a:rPr lang="en-US"/>
+              <a:rPr lang="en-US" dirty="0"/>
               <a:t>Interpreter</a:t>
             </a:r>
           </a:p>
@@ -5136,25 +5223,25 @@
           <a:lstStyle/>
           <a:p>
             <a:r>
-              <a:rPr lang="en-US"/>
+              <a:rPr lang="en-US" dirty="0"/>
               <a:t>Evaluate one command at a time</a:t>
             </a:r>
           </a:p>
           <a:p>
             <a:r>
-              <a:rPr lang="en-US"/>
+              <a:rPr lang="en-US" dirty="0"/>
               <a:t>Immediate feedback</a:t>
             </a:r>
           </a:p>
           <a:p>
             <a:r>
-              <a:rPr lang="en-US"/>
+              <a:rPr lang="en-US" dirty="0"/>
               <a:t>Can evaluate individual expressions</a:t>
             </a:r>
           </a:p>
           <a:p>
             <a:r>
-              <a:rPr lang="en-US"/>
+              <a:rPr lang="en-US" dirty="0"/>
               <a:t>Like a super calculator</a:t>
             </a:r>
           </a:p>
@@ -5182,7 +5269,7 @@
           <a:lstStyle/>
           <a:p>
             <a:r>
-              <a:rPr lang="en-US"/>
+              <a:rPr lang="en-US" dirty="0"/>
               <a:t>Programs</a:t>
             </a:r>
           </a:p>
@@ -5209,7 +5296,7 @@
           <a:bodyPr/>
           <a:lstStyle/>
           <a:p>
-            <a:endParaRPr lang="en-US"/>
+            <a:endParaRPr lang="en-US" dirty="0"/>
           </a:p>
         </p:txBody>
       </p:sp>
@@ -5235,10 +5322,10 @@
           <a:lstStyle/>
           <a:p>
             <a:r>
-              <a:rPr lang="en-US"/>
+              <a:rPr lang="en-US" dirty="0"/>
               <a:t>CMPT 120, SFU Burnaby, Spring 2026, Instructor: T. Donaldson</a:t>
             </a:r>
-            <a:endParaRPr lang="en-AU"/>
+            <a:endParaRPr lang="en-AU" dirty="0"/>
           </a:p>
         </p:txBody>
       </p:sp>
@@ -5329,8 +5416,8 @@
           <a:lstStyle/>
           <a:p>
             <a:r>
-              <a:rPr lang="en-US"/>
-              <a:t>2 Ways of Interacting with Python</a:t>
+              <a:rPr lang="en-US" dirty="0"/>
+              <a:t>2 Main Ways of Interacting with Python</a:t>
             </a:r>
           </a:p>
         </p:txBody>
@@ -5357,7 +5444,7 @@
           <a:lstStyle/>
           <a:p>
             <a:r>
-              <a:rPr lang="en-US"/>
+              <a:rPr lang="en-US" dirty="0"/>
               <a:t>Interpreter</a:t>
             </a:r>
           </a:p>
@@ -5385,25 +5472,25 @@
           <a:lstStyle/>
           <a:p>
             <a:r>
-              <a:rPr lang="en-US"/>
+              <a:rPr lang="en-US" dirty="0"/>
               <a:t>Evaluate one command at a time</a:t>
             </a:r>
           </a:p>
           <a:p>
             <a:r>
-              <a:rPr lang="en-US"/>
+              <a:rPr lang="en-US" dirty="0"/>
               <a:t>Immediate feedback</a:t>
             </a:r>
           </a:p>
           <a:p>
             <a:r>
-              <a:rPr lang="en-US"/>
+              <a:rPr lang="en-US" dirty="0"/>
               <a:t>Can evaluate individual expressions</a:t>
             </a:r>
           </a:p>
           <a:p>
             <a:r>
-              <a:rPr lang="en-US"/>
+              <a:rPr lang="en-US" dirty="0"/>
               <a:t>Like a super calculator</a:t>
             </a:r>
           </a:p>
@@ -5431,7 +5518,7 @@
           <a:lstStyle/>
           <a:p>
             <a:r>
-              <a:rPr lang="en-US"/>
+              <a:rPr lang="en-US" dirty="0"/>
               <a:t>Programs</a:t>
             </a:r>
           </a:p>
@@ -5459,47 +5546,47 @@
           <a:lstStyle/>
           <a:p>
             <a:r>
-              <a:rPr lang="en-US"/>
+              <a:rPr lang="en-US" dirty="0"/>
               <a:t>Write sequences of commands in text files (ending with </a:t>
             </a:r>
             <a:r>
-              <a:rPr lang="en-US">
+              <a:rPr lang="en-US" dirty="0">
                 <a:latin typeface="Consolas" panose="020B0609020204030204" pitchFamily="49" charset="0"/>
                 <a:cs typeface="Consolas" panose="020B0609020204030204" pitchFamily="49" charset="0"/>
               </a:rPr>
               <a:t>.</a:t>
             </a:r>
             <a:r>
-              <a:rPr lang="en-US" err="1">
+              <a:rPr lang="en-US" dirty="0" err="1">
                 <a:latin typeface="Consolas" panose="020B0609020204030204" pitchFamily="49" charset="0"/>
                 <a:cs typeface="Consolas" panose="020B0609020204030204" pitchFamily="49" charset="0"/>
               </a:rPr>
               <a:t>py</a:t>
             </a:r>
             <a:r>
-              <a:rPr lang="en-US"/>
+              <a:rPr lang="en-US" dirty="0"/>
               <a:t>)</a:t>
             </a:r>
           </a:p>
           <a:p>
             <a:r>
-              <a:rPr lang="en-US"/>
+              <a:rPr lang="en-US" dirty="0"/>
               <a:t>The program in these files is called </a:t>
             </a:r>
             <a:r>
-              <a:rPr lang="en-US" b="1"/>
+              <a:rPr lang="en-US" b="1" dirty="0"/>
               <a:t>source code</a:t>
             </a:r>
           </a:p>
           <a:p>
             <a:r>
-              <a:rPr lang="en-US"/>
+              <a:rPr lang="en-US" dirty="0"/>
               <a:t>Python runs them all in sequence</a:t>
             </a:r>
           </a:p>
           <a:p>
             <a:r>
-              <a:rPr lang="en-US"/>
+              <a:rPr lang="en-US" dirty="0"/>
               <a:t>Use an editor like IDLE or VS Code etc. to edit the source code</a:t>
             </a:r>
           </a:p>
@@ -5527,10 +5614,10 @@
           <a:lstStyle/>
           <a:p>
             <a:r>
-              <a:rPr lang="en-US"/>
+              <a:rPr lang="en-US" dirty="0"/>
               <a:t>CMPT 120, SFU Burnaby, Spring 2026, Instructor: T. Donaldson</a:t>
             </a:r>
-            <a:endParaRPr lang="en-AU"/>
+            <a:endParaRPr lang="en-AU" dirty="0"/>
           </a:p>
         </p:txBody>
       </p:sp>
@@ -5621,8 +5708,8 @@
           <a:lstStyle/>
           <a:p>
             <a:r>
-              <a:rPr lang="en-US"/>
-              <a:t>2 Ways of Interacting with Python</a:t>
+              <a:rPr lang="en-US" dirty="0"/>
+              <a:t>2 Main Ways of Interacting with Python</a:t>
             </a:r>
           </a:p>
         </p:txBody>
@@ -5649,7 +5736,7 @@
           <a:lstStyle/>
           <a:p>
             <a:r>
-              <a:rPr lang="en-US"/>
+              <a:rPr lang="en-US" dirty="0"/>
               <a:t>Interpreter</a:t>
             </a:r>
           </a:p>
@@ -5677,25 +5764,25 @@
           <a:lstStyle/>
           <a:p>
             <a:r>
-              <a:rPr lang="en-US"/>
+              <a:rPr lang="en-US" dirty="0"/>
               <a:t>Evaluate one command at a time</a:t>
             </a:r>
           </a:p>
           <a:p>
             <a:r>
-              <a:rPr lang="en-US"/>
+              <a:rPr lang="en-US" dirty="0"/>
               <a:t>Immediate feedback</a:t>
             </a:r>
           </a:p>
           <a:p>
             <a:r>
-              <a:rPr lang="en-US"/>
+              <a:rPr lang="en-US" dirty="0"/>
               <a:t>Can evaluate individual expressions</a:t>
             </a:r>
           </a:p>
           <a:p>
             <a:r>
-              <a:rPr lang="en-US"/>
+              <a:rPr lang="en-US" dirty="0"/>
               <a:t>Like a super calculator</a:t>
             </a:r>
           </a:p>
@@ -5723,7 +5810,7 @@
           <a:lstStyle/>
           <a:p>
             <a:r>
-              <a:rPr lang="en-US"/>
+              <a:rPr lang="en-US" dirty="0"/>
               <a:t>Programs</a:t>
             </a:r>
           </a:p>
@@ -5751,47 +5838,47 @@
           <a:lstStyle/>
           <a:p>
             <a:r>
-              <a:rPr lang="en-US"/>
+              <a:rPr lang="en-US" dirty="0"/>
               <a:t>Write sequences of commands in text files (ending with </a:t>
             </a:r>
             <a:r>
-              <a:rPr lang="en-US">
+              <a:rPr lang="en-US" dirty="0">
                 <a:latin typeface="Consolas" panose="020B0609020204030204" pitchFamily="49" charset="0"/>
                 <a:cs typeface="Consolas" panose="020B0609020204030204" pitchFamily="49" charset="0"/>
               </a:rPr>
               <a:t>.</a:t>
             </a:r>
             <a:r>
-              <a:rPr lang="en-US" err="1">
+              <a:rPr lang="en-US" dirty="0" err="1">
                 <a:latin typeface="Consolas" panose="020B0609020204030204" pitchFamily="49" charset="0"/>
                 <a:cs typeface="Consolas" panose="020B0609020204030204" pitchFamily="49" charset="0"/>
               </a:rPr>
               <a:t>py</a:t>
             </a:r>
             <a:r>
-              <a:rPr lang="en-US"/>
+              <a:rPr lang="en-US" dirty="0"/>
               <a:t>)</a:t>
             </a:r>
           </a:p>
           <a:p>
             <a:r>
-              <a:rPr lang="en-US"/>
+              <a:rPr lang="en-US" dirty="0"/>
               <a:t>The program in these files is called </a:t>
             </a:r>
             <a:r>
-              <a:rPr lang="en-US" b="1"/>
+              <a:rPr lang="en-US" b="1" dirty="0"/>
               <a:t>source code</a:t>
             </a:r>
           </a:p>
           <a:p>
             <a:r>
-              <a:rPr lang="en-US"/>
+              <a:rPr lang="en-US" dirty="0"/>
               <a:t>Python runs them all in sequence</a:t>
             </a:r>
           </a:p>
           <a:p>
             <a:r>
-              <a:rPr lang="en-US"/>
+              <a:rPr lang="en-US" dirty="0"/>
               <a:t>Use an editor like IDLE or VS Code etc. to edit the source code</a:t>
             </a:r>
           </a:p>
@@ -5819,10 +5906,10 @@
           <a:lstStyle/>
           <a:p>
             <a:r>
-              <a:rPr lang="en-US"/>
+              <a:rPr lang="en-US" dirty="0"/>
               <a:t>CMPT 120, SFU Burnaby, Spring 2026, Instructor: T. Donaldson</a:t>
             </a:r>
-            <a:endParaRPr lang="en-AU"/>
+            <a:endParaRPr lang="en-AU" dirty="0"/>
           </a:p>
         </p:txBody>
       </p:sp>
@@ -5890,15 +5977,15 @@
           <a:p>
             <a:pPr algn="ctr"/>
             <a:r>
-              <a:rPr lang="en-US"/>
+              <a:rPr lang="en-US" dirty="0"/>
               <a:t>Another popular format is a </a:t>
             </a:r>
             <a:r>
-              <a:rPr lang="en-US" b="1"/>
+              <a:rPr lang="en-US" b="1" dirty="0"/>
               <a:t>notebook</a:t>
             </a:r>
             <a:r>
-              <a:rPr lang="en-US"/>
+              <a:rPr lang="en-US" dirty="0"/>
               <a:t>, where Python code and text notes are interspersed.</a:t>
             </a:r>
           </a:p>
@@ -5918,7 +6005,7 @@
         </p:nvSpPr>
         <p:spPr>
           <a:xfrm>
-            <a:off x="8849333" y="897552"/>
+            <a:off x="8889090" y="1257210"/>
             <a:ext cx="3140378" cy="1200329"/>
           </a:xfrm>
           <a:prstGeom prst="rect">
@@ -5939,7 +6026,7 @@
           <a:p>
             <a:pPr algn="ctr"/>
             <a:r>
-              <a:rPr lang="en-US"/>
+              <a:rPr lang="en-US" dirty="0"/>
               <a:t>In this course we will mainly write programs, but it is often useful to user the interpreter to help write the program.</a:t>
             </a:r>
           </a:p>
@@ -6003,7 +6090,7 @@
           <a:lstStyle/>
           <a:p>
             <a:r>
-              <a:rPr lang="en-US"/>
+              <a:rPr lang="en-US" dirty="0"/>
               <a:t>The IDLE Editor</a:t>
             </a:r>
           </a:p>
@@ -6031,42 +6118,42 @@
           <a:lstStyle/>
           <a:p>
             <a:r>
-              <a:rPr lang="en-US" b="1"/>
+              <a:rPr lang="en-US" b="1" dirty="0"/>
               <a:t>IDLE</a:t>
             </a:r>
             <a:r>
-              <a:rPr lang="en-US"/>
+              <a:rPr lang="en-US" dirty="0"/>
               <a:t> is the free interpreter and editor that comes with Python</a:t>
             </a:r>
           </a:p>
           <a:p>
             <a:r>
-              <a:rPr lang="en-US"/>
+              <a:rPr lang="en-US" dirty="0"/>
               <a:t>Search for and run “</a:t>
             </a:r>
             <a:r>
-              <a:rPr lang="en-US">
+              <a:rPr lang="en-US" dirty="0">
                 <a:latin typeface="Consolas" panose="020B0609020204030204" pitchFamily="49" charset="0"/>
                 <a:cs typeface="Consolas" panose="020B0609020204030204" pitchFamily="49" charset="0"/>
               </a:rPr>
               <a:t>IDLE</a:t>
             </a:r>
             <a:r>
-              <a:rPr lang="en-US"/>
+              <a:rPr lang="en-US" dirty="0"/>
               <a:t>” on your computer</a:t>
             </a:r>
           </a:p>
           <a:p>
             <a:pPr lvl="1"/>
             <a:r>
-              <a:rPr lang="en-US"/>
+              <a:rPr lang="en-US" dirty="0"/>
               <a:t>If you don’t have it you can install Python from </a:t>
             </a:r>
             <a:r>
-              <a:rPr lang="en-US" err="1"/>
+              <a:rPr lang="en-US" dirty="0" err="1"/>
               <a:t>www.python.org</a:t>
             </a:r>
-            <a:endParaRPr lang="en-US"/>
+            <a:endParaRPr lang="en-US" dirty="0"/>
           </a:p>
         </p:txBody>
       </p:sp>
@@ -6163,26 +6250,26 @@
           <a:p>
             <a:pPr algn="ctr"/>
             <a:r>
-              <a:rPr lang="en-US"/>
+              <a:rPr lang="en-US" dirty="0"/>
               <a:t>This is the </a:t>
             </a:r>
             <a:r>
-              <a:rPr lang="en-US" b="1"/>
+              <a:rPr lang="en-US" b="1" dirty="0"/>
               <a:t>interpreter</a:t>
             </a:r>
             <a:r>
-              <a:rPr lang="en-US"/>
+              <a:rPr lang="en-US" dirty="0"/>
               <a:t> window. Note the Python prompt: </a:t>
             </a:r>
             <a:r>
-              <a:rPr lang="en-US" b="1">
+              <a:rPr lang="en-US" b="1" dirty="0">
                 <a:latin typeface="Consolas" panose="020B0609020204030204" pitchFamily="49" charset="0"/>
                 <a:cs typeface="Consolas" panose="020B0609020204030204" pitchFamily="49" charset="0"/>
               </a:rPr>
               <a:t>&gt;&gt;&gt;</a:t>
             </a:r>
             <a:r>
-              <a:rPr lang="en-US"/>
+              <a:rPr lang="en-US" dirty="0"/>
               <a:t> </a:t>
             </a:r>
           </a:p>
@@ -6276,7 +6363,7 @@
           <a:lstStyle/>
           <a:p>
             <a:r>
-              <a:rPr lang="en-US"/>
+              <a:rPr lang="en-US" dirty="0"/>
               <a:t>The IDLE Editor</a:t>
             </a:r>
           </a:p>
@@ -6304,42 +6391,42 @@
           <a:lstStyle/>
           <a:p>
             <a:r>
-              <a:rPr lang="en-US" b="1"/>
+              <a:rPr lang="en-US" b="1" dirty="0"/>
               <a:t>IDLE</a:t>
             </a:r>
             <a:r>
-              <a:rPr lang="en-US"/>
+              <a:rPr lang="en-US" dirty="0"/>
               <a:t> is the free interpreter and editor that comes with Python</a:t>
             </a:r>
           </a:p>
           <a:p>
             <a:r>
-              <a:rPr lang="en-US"/>
+              <a:rPr lang="en-US" dirty="0"/>
               <a:t>Search for and run “</a:t>
             </a:r>
             <a:r>
-              <a:rPr lang="en-US">
+              <a:rPr lang="en-US" dirty="0">
                 <a:latin typeface="Consolas" panose="020B0609020204030204" pitchFamily="49" charset="0"/>
                 <a:cs typeface="Consolas" panose="020B0609020204030204" pitchFamily="49" charset="0"/>
               </a:rPr>
               <a:t>IDLE</a:t>
             </a:r>
             <a:r>
-              <a:rPr lang="en-US"/>
+              <a:rPr lang="en-US" dirty="0"/>
               <a:t>” on your computer</a:t>
             </a:r>
           </a:p>
           <a:p>
             <a:pPr lvl="1"/>
             <a:r>
-              <a:rPr lang="en-US"/>
+              <a:rPr lang="en-US" dirty="0"/>
               <a:t>If you don’t have it you can install Python from </a:t>
             </a:r>
             <a:r>
-              <a:rPr lang="en-US" err="1"/>
+              <a:rPr lang="en-US" dirty="0" err="1"/>
               <a:t>www.python.org</a:t>
             </a:r>
-            <a:endParaRPr lang="en-US"/>
+            <a:endParaRPr lang="en-US" dirty="0"/>
           </a:p>
         </p:txBody>
       </p:sp>
@@ -6436,15 +6523,15 @@
           <a:p>
             <a:pPr algn="ctr"/>
             <a:r>
-              <a:rPr lang="en-US"/>
+              <a:rPr lang="en-US" dirty="0"/>
               <a:t>This is the </a:t>
             </a:r>
             <a:r>
-              <a:rPr lang="en-US" b="1"/>
+              <a:rPr lang="en-US" b="1" dirty="0"/>
               <a:t>program</a:t>
             </a:r>
             <a:r>
-              <a:rPr lang="en-US"/>
+              <a:rPr lang="en-US" dirty="0"/>
               <a:t> window. Note the name of the file at the top (currently *untitled*).</a:t>
             </a:r>
           </a:p>
@@ -6534,7 +6621,7 @@
           <a:lstStyle/>
           <a:p>
             <a:pPr algn="ctr"/>
-            <a:endParaRPr lang="en-US"/>
+            <a:endParaRPr lang="en-US" dirty="0"/>
           </a:p>
         </p:txBody>
       </p:sp>
@@ -6573,31 +6660,31 @@
           <a:p>
             <a:pPr algn="ctr"/>
             <a:r>
-              <a:rPr lang="en-US"/>
+              <a:rPr lang="en-US" dirty="0"/>
               <a:t>To run the program, choose </a:t>
             </a:r>
             <a:r>
-              <a:rPr lang="en-US" b="1"/>
+              <a:rPr lang="en-US" b="1" dirty="0"/>
               <a:t>Run</a:t>
             </a:r>
             <a:r>
-              <a:rPr lang="en-US"/>
+              <a:rPr lang="en-US" dirty="0"/>
               <a:t> Module in the </a:t>
             </a:r>
             <a:r>
-              <a:rPr lang="en-US" b="1"/>
+              <a:rPr lang="en-US" b="1" dirty="0"/>
               <a:t>Run</a:t>
             </a:r>
             <a:r>
-              <a:rPr lang="en-US"/>
+              <a:rPr lang="en-US" dirty="0"/>
               <a:t> menu, or press </a:t>
             </a:r>
             <a:r>
-              <a:rPr lang="en-US" b="1"/>
+              <a:rPr lang="en-US" b="1" dirty="0"/>
               <a:t>F5</a:t>
             </a:r>
             <a:r>
-              <a:rPr lang="en-US"/>
+              <a:rPr lang="en-US" dirty="0"/>
               <a:t>.</a:t>
             </a:r>
           </a:p>
@@ -6732,17 +6819,17 @@
           <a:p>
             <a:pPr algn="ctr"/>
             <a:r>
-              <a:rPr lang="en-US"/>
+              <a:rPr lang="en-US" dirty="0"/>
               <a:t>When you run the program in IDLE you will be asked to save it in a file first. I’ve called the file </a:t>
             </a:r>
             <a:r>
-              <a:rPr lang="en-US" err="1">
+              <a:rPr lang="en-US" dirty="0" err="1">
                 <a:latin typeface="Consolas" panose="020B0609020204030204" pitchFamily="49" charset="0"/>
                 <a:cs typeface="Consolas" panose="020B0609020204030204" pitchFamily="49" charset="0"/>
               </a:rPr>
               <a:t>hello.py</a:t>
             </a:r>
-            <a:endParaRPr lang="en-US">
+            <a:endParaRPr lang="en-US" dirty="0">
               <a:latin typeface="Consolas" panose="020B0609020204030204" pitchFamily="49" charset="0"/>
               <a:cs typeface="Consolas" panose="020B0609020204030204" pitchFamily="49" charset="0"/>
             </a:endParaRPr>
@@ -6869,7 +6956,7 @@
           <a:lstStyle/>
           <a:p>
             <a:pPr algn="ctr"/>
-            <a:endParaRPr lang="en-US"/>
+            <a:endParaRPr lang="en-US" dirty="0"/>
           </a:p>
         </p:txBody>
       </p:sp>
@@ -6949,10 +7036,10 @@
           <a:p>
             <a:pPr algn="ctr"/>
             <a:r>
-              <a:rPr lang="en-US"/>
+              <a:rPr lang="en-US" dirty="0"/>
               <a:t>The results of the program appear in the interpreter window.</a:t>
             </a:r>
-            <a:endParaRPr lang="en-US">
+            <a:endParaRPr lang="en-US" dirty="0">
               <a:latin typeface="Consolas" panose="020B0609020204030204" pitchFamily="49" charset="0"/>
               <a:cs typeface="Consolas" panose="020B0609020204030204" pitchFamily="49" charset="0"/>
             </a:endParaRPr>
@@ -7182,17 +7269,17 @@
           <a:p>
             <a:pPr algn="ctr"/>
             <a:r>
-              <a:rPr lang="en-US"/>
+              <a:rPr lang="en-US" dirty="0"/>
               <a:t>When you run the program in IDLE you will be asked to save it in a file first. I’ve called the file </a:t>
             </a:r>
             <a:r>
-              <a:rPr lang="en-US" err="1">
+              <a:rPr lang="en-US" dirty="0" err="1">
                 <a:latin typeface="Consolas" panose="020B0609020204030204" pitchFamily="49" charset="0"/>
                 <a:cs typeface="Consolas" panose="020B0609020204030204" pitchFamily="49" charset="0"/>
               </a:rPr>
               <a:t>hello.py</a:t>
             </a:r>
-            <a:endParaRPr lang="en-US">
+            <a:endParaRPr lang="en-US" dirty="0">
               <a:latin typeface="Consolas" panose="020B0609020204030204" pitchFamily="49" charset="0"/>
               <a:cs typeface="Consolas" panose="020B0609020204030204" pitchFamily="49" charset="0"/>
             </a:endParaRPr>
@@ -7319,7 +7406,7 @@
           <a:lstStyle/>
           <a:p>
             <a:pPr algn="ctr"/>
-            <a:endParaRPr lang="en-US"/>
+            <a:endParaRPr lang="en-US" dirty="0"/>
           </a:p>
         </p:txBody>
       </p:sp>
@@ -7399,10 +7486,10 @@
           <a:p>
             <a:pPr algn="ctr"/>
             <a:r>
-              <a:rPr lang="en-US"/>
+              <a:rPr lang="en-US" dirty="0"/>
               <a:t>The results of the program appear in the interpreter window.</a:t>
             </a:r>
-            <a:endParaRPr lang="en-US">
+            <a:endParaRPr lang="en-US" dirty="0">
               <a:latin typeface="Consolas" panose="020B0609020204030204" pitchFamily="49" charset="0"/>
               <a:cs typeface="Consolas" panose="020B0609020204030204" pitchFamily="49" charset="0"/>
             </a:endParaRPr>
@@ -7538,17 +7625,17 @@
           <a:p>
             <a:pPr algn="ctr"/>
             <a:r>
-              <a:rPr lang="en-US" b="1"/>
+              <a:rPr lang="en-US" b="1" dirty="0"/>
               <a:t>Careful!</a:t>
             </a:r>
             <a:br>
-              <a:rPr lang="en-US"/>
+              <a:rPr lang="en-US" dirty="0"/>
             </a:br>
             <a:r>
-              <a:rPr lang="en-US"/>
+              <a:rPr lang="en-US" dirty="0"/>
               <a:t>If you are new to programming it can be easy to confuse these windows.</a:t>
             </a:r>
-            <a:endParaRPr lang="en-US">
+            <a:endParaRPr lang="en-US" dirty="0">
               <a:latin typeface="Consolas" panose="020B0609020204030204" pitchFamily="49" charset="0"/>
               <a:cs typeface="Consolas" panose="020B0609020204030204" pitchFamily="49" charset="0"/>
             </a:endParaRPr>

</xml_diff>